<commit_message>
animations and last touches
</commit_message>
<xml_diff>
--- a/Presentazione.pptx
+++ b/Presentazione.pptx
@@ -221,7 +221,7 @@
           <a:p>
             <a:fld id="{D62E0E92-620B-48BA-B70C-9AD2F1AE0B02}" type="datetimeFigureOut">
               <a:rPr lang="it-IT" smtClean="0"/>
-              <a:t>21/11/2021</a:t>
+              <a:t>25/11/2021</a:t>
             </a:fld>
             <a:endParaRPr lang="it-IT"/>
           </a:p>
@@ -637,7 +637,7 @@
           <a:p>
             <a:fld id="{99327CAC-D07F-4375-87D3-274161A65017}" type="datetime1">
               <a:rPr lang="it-IT" smtClean="0"/>
-              <a:t>21/11/2021</a:t>
+              <a:t>25/11/2021</a:t>
             </a:fld>
             <a:endParaRPr lang="en-US"/>
           </a:p>
@@ -849,7 +849,7 @@
           <a:p>
             <a:fld id="{51AC3528-80E1-40F5-8488-35F0BAB45D0E}" type="datetime1">
               <a:rPr lang="it-IT" smtClean="0"/>
-              <a:t>21/11/2021</a:t>
+              <a:t>25/11/2021</a:t>
             </a:fld>
             <a:endParaRPr lang="en-US"/>
           </a:p>
@@ -1060,7 +1060,7 @@
           <a:p>
             <a:fld id="{999C57C1-E281-4B39-A555-1C7F2E300E57}" type="datetime1">
               <a:rPr lang="it-IT" smtClean="0"/>
-              <a:t>21/11/2021</a:t>
+              <a:t>25/11/2021</a:t>
             </a:fld>
             <a:endParaRPr lang="en-US"/>
           </a:p>
@@ -1261,7 +1261,7 @@
           <a:p>
             <a:fld id="{96195510-5B22-4857-83F8-196A83FBB0FB}" type="datetime1">
               <a:rPr lang="it-IT" smtClean="0"/>
-              <a:t>21/11/2021</a:t>
+              <a:t>25/11/2021</a:t>
             </a:fld>
             <a:endParaRPr lang="en-US"/>
           </a:p>
@@ -1540,7 +1540,7 @@
           <a:p>
             <a:fld id="{78209844-9054-44E2-88A2-9A387D6F4287}" type="datetime1">
               <a:rPr lang="it-IT" smtClean="0"/>
-              <a:t>21/11/2021</a:t>
+              <a:t>25/11/2021</a:t>
             </a:fld>
             <a:endParaRPr lang="en-US"/>
           </a:p>
@@ -1815,7 +1815,7 @@
           <a:p>
             <a:fld id="{C5BF11B8-AC7D-4793-8EA8-2BED87C88F46}" type="datetime1">
               <a:rPr lang="it-IT" smtClean="0"/>
-              <a:t>21/11/2021</a:t>
+              <a:t>25/11/2021</a:t>
             </a:fld>
             <a:endParaRPr lang="en-US"/>
           </a:p>
@@ -2233,7 +2233,7 @@
           <a:p>
             <a:fld id="{0D8D95D6-2200-4E54-9E4C-6F5B3A84886A}" type="datetime1">
               <a:rPr lang="it-IT" smtClean="0"/>
-              <a:t>21/11/2021</a:t>
+              <a:t>25/11/2021</a:t>
             </a:fld>
             <a:endParaRPr lang="en-US"/>
           </a:p>
@@ -2383,7 +2383,7 @@
           <a:p>
             <a:fld id="{868694B6-E987-4B97-AD9A-D39CF7EFD086}" type="datetime1">
               <a:rPr lang="it-IT" smtClean="0"/>
-              <a:t>21/11/2021</a:t>
+              <a:t>25/11/2021</a:t>
             </a:fld>
             <a:endParaRPr lang="en-US"/>
           </a:p>
@@ -2499,7 +2499,7 @@
           <a:p>
             <a:fld id="{045A6181-2606-4AA7-989B-FE6B921ADE57}" type="datetime1">
               <a:rPr lang="it-IT" smtClean="0"/>
-              <a:t>21/11/2021</a:t>
+              <a:t>25/11/2021</a:t>
             </a:fld>
             <a:endParaRPr lang="en-US"/>
           </a:p>
@@ -2814,7 +2814,7 @@
           <a:p>
             <a:fld id="{159002DC-5226-43C0-B7F7-F36643C6C226}" type="datetime1">
               <a:rPr lang="it-IT" smtClean="0"/>
-              <a:t>21/11/2021</a:t>
+              <a:t>25/11/2021</a:t>
             </a:fld>
             <a:endParaRPr lang="en-US"/>
           </a:p>
@@ -3108,7 +3108,7 @@
           <a:p>
             <a:fld id="{536DD7B1-67C3-470E-AB26-E97772E8B11C}" type="datetime1">
               <a:rPr lang="it-IT" smtClean="0"/>
-              <a:t>21/11/2021</a:t>
+              <a:t>25/11/2021</a:t>
             </a:fld>
             <a:endParaRPr lang="en-US"/>
           </a:p>
@@ -3352,7 +3352,7 @@
           <a:p>
             <a:fld id="{A31D3A21-AE62-40E6-929E-02B5E55AC6C2}" type="datetime1">
               <a:rPr lang="it-IT" smtClean="0"/>
-              <a:t>21/11/2021</a:t>
+              <a:t>25/11/2021</a:t>
             </a:fld>
             <a:endParaRPr lang="en-US" dirty="0"/>
           </a:p>
@@ -3902,20 +3902,12 @@
           <a:p>
             <a:pPr algn="l"/>
             <a:r>
-              <a:rPr lang="it-IT">
-                <a:solidFill>
-                  <a:srgbClr val="FFFFFF"/>
-                </a:solidFill>
-              </a:rPr>
-              <a:t>Co-relatori</a:t>
-            </a:r>
-            <a:r>
               <a:rPr lang="it-IT" dirty="0">
                 <a:solidFill>
                   <a:srgbClr val="FFFFFF"/>
                 </a:solidFill>
               </a:rPr>
-              <a:t>: Alessio Mingozzi, Filippo Aleotti, Matteo Poggi</a:t>
+              <a:t>Co-relatori: Alessio Mingozzi, Filippo Aleotti, Matteo Poggi</a:t>
             </a:r>
           </a:p>
           <a:p>
@@ -3951,7 +3943,7 @@
           <a:p>
             <a:fld id="{008DE197-ECA9-4A18-B8F0-70B4B45B1EAE}" type="datetime1">
               <a:rPr lang="it-IT" smtClean="0"/>
-              <a:t>21/11/2021</a:t>
+              <a:t>25/11/2021</a:t>
             </a:fld>
             <a:endParaRPr lang="en-US"/>
           </a:p>
@@ -4156,15 +4148,7 @@
             </a:br>
             <a:r>
               <a:rPr lang="it-IT" dirty="0"/>
-              <a:t>La soluzione sta nel </a:t>
-            </a:r>
-            <a:r>
-              <a:rPr lang="it-IT" dirty="0" err="1"/>
-              <a:t>tweaking</a:t>
-            </a:r>
-            <a:r>
-              <a:rPr lang="it-IT" dirty="0"/>
-              <a:t> del </a:t>
+              <a:t>La soluzione sta nella modifica del </a:t>
             </a:r>
             <a:r>
               <a:rPr lang="it-IT" dirty="0" err="1"/>
@@ -4187,7 +4171,15 @@
             </a:br>
             <a:r>
               <a:rPr lang="it-IT" dirty="0"/>
-              <a:t>Trovare un middle ground tra falsi positivi e output corretto.</a:t>
+              <a:t>Trovare quindi una via </a:t>
+            </a:r>
+            <a:r>
+              <a:rPr lang="it-IT"/>
+              <a:t>di mezzo tra </a:t>
+            </a:r>
+            <a:r>
+              <a:rPr lang="it-IT" dirty="0"/>
+              <a:t>falsi positivi e output corretto.</a:t>
             </a:r>
           </a:p>
           <a:p>
@@ -4266,7 +4258,7 @@
                 <a:tabLst/>
                 <a:defRPr/>
               </a:pPr>
-              <a:t>21/11/2021</a:t>
+              <a:t>25/11/2021</a:t>
             </a:fld>
             <a:endParaRPr kumimoji="0" lang="en-US" sz="900" b="0" i="0" u="none" strike="noStrike" kern="1200" cap="none" spc="0" normalizeH="0" baseline="0" noProof="0">
               <a:ln>
@@ -4618,6 +4610,124 @@
           </a:p>
         </p:txBody>
       </p:sp>
+      <p:sp>
+        <p:nvSpPr>
+          <p:cNvPr id="13" name="Ovale 12">
+            <a:extLst>
+              <a:ext uri="{FF2B5EF4-FFF2-40B4-BE49-F238E27FC236}">
+                <a16:creationId xmlns:a16="http://schemas.microsoft.com/office/drawing/2014/main" id="{230E67D4-46ED-459A-A60B-C9528805A9ED}"/>
+              </a:ext>
+            </a:extLst>
+          </p:cNvPr>
+          <p:cNvSpPr/>
+          <p:nvPr/>
+        </p:nvSpPr>
+        <p:spPr>
+          <a:xfrm>
+            <a:off x="9788443" y="4267451"/>
+            <a:ext cx="365760" cy="365760"/>
+          </a:xfrm>
+          <a:prstGeom prst="ellipse">
+            <a:avLst/>
+          </a:prstGeom>
+          <a:solidFill>
+            <a:srgbClr val="E71224">
+              <a:alpha val="5000"/>
+            </a:srgbClr>
+          </a:solidFill>
+          <a:ln w="18000">
+            <a:solidFill>
+              <a:srgbClr val="E71224"/>
+            </a:solidFill>
+          </a:ln>
+        </p:spPr>
+        <p:style>
+          <a:lnRef idx="2">
+            <a:schemeClr val="accent1">
+              <a:shade val="50000"/>
+            </a:schemeClr>
+          </a:lnRef>
+          <a:fillRef idx="1">
+            <a:schemeClr val="accent1"/>
+          </a:fillRef>
+          <a:effectRef idx="0">
+            <a:schemeClr val="accent1"/>
+          </a:effectRef>
+          <a:fontRef idx="minor">
+            <a:schemeClr val="lt1"/>
+          </a:fontRef>
+        </p:style>
+        <p:txBody>
+          <a:bodyPr wrap="none" rtlCol="0" anchor="ctr" anchorCtr="1"/>
+          <a:lstStyle/>
+          <a:p>
+            <a:endParaRPr lang="de-DE">
+              <a:solidFill>
+                <a:srgbClr val="E71224"/>
+              </a:solidFill>
+            </a:endParaRPr>
+          </a:p>
+        </p:txBody>
+      </p:sp>
+      <p:sp>
+        <p:nvSpPr>
+          <p:cNvPr id="14" name="Ovale 13">
+            <a:extLst>
+              <a:ext uri="{FF2B5EF4-FFF2-40B4-BE49-F238E27FC236}">
+                <a16:creationId xmlns:a16="http://schemas.microsoft.com/office/drawing/2014/main" id="{D510073F-A2F4-4ADF-A1BA-CF7C638E139D}"/>
+              </a:ext>
+            </a:extLst>
+          </p:cNvPr>
+          <p:cNvSpPr/>
+          <p:nvPr/>
+        </p:nvSpPr>
+        <p:spPr>
+          <a:xfrm>
+            <a:off x="2686997" y="3123259"/>
+            <a:ext cx="365760" cy="365760"/>
+          </a:xfrm>
+          <a:prstGeom prst="ellipse">
+            <a:avLst/>
+          </a:prstGeom>
+          <a:solidFill>
+            <a:srgbClr val="E71224">
+              <a:alpha val="5000"/>
+            </a:srgbClr>
+          </a:solidFill>
+          <a:ln w="18000">
+            <a:solidFill>
+              <a:srgbClr val="E71224"/>
+            </a:solidFill>
+          </a:ln>
+        </p:spPr>
+        <p:style>
+          <a:lnRef idx="2">
+            <a:schemeClr val="accent1">
+              <a:shade val="50000"/>
+            </a:schemeClr>
+          </a:lnRef>
+          <a:fillRef idx="1">
+            <a:schemeClr val="accent1"/>
+          </a:fillRef>
+          <a:effectRef idx="0">
+            <a:schemeClr val="accent1"/>
+          </a:effectRef>
+          <a:fontRef idx="minor">
+            <a:schemeClr val="lt1"/>
+          </a:fontRef>
+        </p:style>
+        <p:txBody>
+          <a:bodyPr wrap="none" rtlCol="0" anchor="ctr" anchorCtr="1"/>
+          <a:lstStyle/>
+          <a:p>
+            <a:endParaRPr lang="de-DE">
+              <a:solidFill>
+                <a:srgbClr val="E71224"/>
+              </a:solidFill>
+            </a:endParaRPr>
+          </a:p>
+        </p:txBody>
+      </p:sp>
     </p:spTree>
     <p:extLst>
       <p:ext uri="{BB962C8B-B14F-4D97-AF65-F5344CB8AC3E}">
@@ -4628,6 +4738,131 @@
   <p:clrMapOvr>
     <a:masterClrMapping/>
   </p:clrMapOvr>
+  <p:timing>
+    <p:tnLst>
+      <p:par>
+        <p:cTn id="1" dur="indefinite" restart="never" nodeType="tmRoot">
+          <p:childTnLst>
+            <p:seq concurrent="1" nextAc="seek">
+              <p:cTn id="2" dur="indefinite" nodeType="mainSeq">
+                <p:childTnLst>
+                  <p:par>
+                    <p:cTn id="3" fill="hold">
+                      <p:stCondLst>
+                        <p:cond delay="indefinite"/>
+                        <p:cond evt="onBegin" delay="0">
+                          <p:tn val="2"/>
+                        </p:cond>
+                      </p:stCondLst>
+                      <p:childTnLst>
+                        <p:par>
+                          <p:cTn id="4" fill="hold">
+                            <p:stCondLst>
+                              <p:cond delay="0"/>
+                            </p:stCondLst>
+                            <p:childTnLst>
+                              <p:par>
+                                <p:cTn id="5" presetID="16" presetClass="entr" presetSubtype="21" fill="hold" grpId="0" nodeType="withEffect">
+                                  <p:stCondLst>
+                                    <p:cond delay="250"/>
+                                  </p:stCondLst>
+                                  <p:childTnLst>
+                                    <p:set>
+                                      <p:cBhvr>
+                                        <p:cTn id="6" dur="1" fill="hold">
+                                          <p:stCondLst>
+                                            <p:cond delay="0"/>
+                                          </p:stCondLst>
+                                        </p:cTn>
+                                        <p:tgtEl>
+                                          <p:spTgt spid="13"/>
+                                        </p:tgtEl>
+                                        <p:attrNameLst>
+                                          <p:attrName>style.visibility</p:attrName>
+                                        </p:attrNameLst>
+                                      </p:cBhvr>
+                                      <p:to>
+                                        <p:strVal val="visible"/>
+                                      </p:to>
+                                    </p:set>
+                                    <p:animEffect transition="in" filter="barn(inVertical)">
+                                      <p:cBhvr>
+                                        <p:cTn id="7" dur="500"/>
+                                        <p:tgtEl>
+                                          <p:spTgt spid="13"/>
+                                        </p:tgtEl>
+                                      </p:cBhvr>
+                                    </p:animEffect>
+                                  </p:childTnLst>
+                                </p:cTn>
+                              </p:par>
+                              <p:par>
+                                <p:cTn id="8" presetID="16" presetClass="entr" presetSubtype="21" fill="hold" grpId="0" nodeType="withEffect">
+                                  <p:stCondLst>
+                                    <p:cond delay="250"/>
+                                  </p:stCondLst>
+                                  <p:childTnLst>
+                                    <p:set>
+                                      <p:cBhvr>
+                                        <p:cTn id="9" dur="1" fill="hold">
+                                          <p:stCondLst>
+                                            <p:cond delay="0"/>
+                                          </p:stCondLst>
+                                        </p:cTn>
+                                        <p:tgtEl>
+                                          <p:spTgt spid="14"/>
+                                        </p:tgtEl>
+                                        <p:attrNameLst>
+                                          <p:attrName>style.visibility</p:attrName>
+                                        </p:attrNameLst>
+                                      </p:cBhvr>
+                                      <p:to>
+                                        <p:strVal val="visible"/>
+                                      </p:to>
+                                    </p:set>
+                                    <p:animEffect transition="in" filter="barn(inVertical)">
+                                      <p:cBhvr>
+                                        <p:cTn id="10" dur="500"/>
+                                        <p:tgtEl>
+                                          <p:spTgt spid="14"/>
+                                        </p:tgtEl>
+                                      </p:cBhvr>
+                                    </p:animEffect>
+                                  </p:childTnLst>
+                                </p:cTn>
+                              </p:par>
+                            </p:childTnLst>
+                          </p:cTn>
+                        </p:par>
+                      </p:childTnLst>
+                    </p:cTn>
+                  </p:par>
+                </p:childTnLst>
+              </p:cTn>
+              <p:prevCondLst>
+                <p:cond evt="onPrev" delay="0">
+                  <p:tgtEl>
+                    <p:sldTgt/>
+                  </p:tgtEl>
+                </p:cond>
+              </p:prevCondLst>
+              <p:nextCondLst>
+                <p:cond evt="onNext" delay="0">
+                  <p:tgtEl>
+                    <p:sldTgt/>
+                  </p:tgtEl>
+                </p:cond>
+              </p:nextCondLst>
+            </p:seq>
+          </p:childTnLst>
+        </p:cTn>
+      </p:par>
+    </p:tnLst>
+    <p:bldLst>
+      <p:bldP spid="13" grpId="0" animBg="1"/>
+      <p:bldP spid="14" grpId="0" animBg="1"/>
+    </p:bldLst>
+  </p:timing>
 </p:sld>
 </file>
 
@@ -4743,13 +4978,13 @@
         </p:nvSpPr>
         <p:spPr>
           <a:xfrm>
-            <a:off x="761998" y="1540573"/>
-            <a:ext cx="10667998" cy="1463884"/>
+            <a:off x="761996" y="1461582"/>
+            <a:ext cx="10667998" cy="1612326"/>
           </a:xfrm>
         </p:spPr>
         <p:txBody>
           <a:bodyPr>
-            <a:normAutofit lnSpcReduction="10000"/>
+            <a:normAutofit/>
           </a:bodyPr>
           <a:lstStyle/>
           <a:p>
@@ -4764,7 +4999,7 @@
             </a:r>
             <a:r>
               <a:rPr lang="it-IT" dirty="0"/>
-              <a:t> sull’output, questo ha preso il valore di 0,186737.</a:t>
+              <a:t> sull’output, questo è stato modificato a 0,186737 dall’originale 0,1.</a:t>
             </a:r>
           </a:p>
           <a:p>
@@ -4846,7 +5081,7 @@
                 <a:tabLst/>
                 <a:defRPr/>
               </a:pPr>
-              <a:t>21/11/2021</a:t>
+              <a:t>25/11/2021</a:t>
             </a:fld>
             <a:endParaRPr kumimoji="0" lang="en-US" sz="900" b="0" i="0" u="none" strike="noStrike" kern="1200" cap="none" spc="0" normalizeH="0" baseline="0" noProof="0">
               <a:ln>
@@ -5232,12 +5467,14 @@
         </p:nvSpPr>
         <p:spPr>
           <a:xfrm>
-            <a:off x="762000" y="2099532"/>
-            <a:ext cx="10667998" cy="3922841"/>
+            <a:off x="762000" y="1826399"/>
+            <a:ext cx="10667998" cy="4283456"/>
           </a:xfrm>
         </p:spPr>
         <p:txBody>
-          <a:bodyPr/>
+          <a:bodyPr>
+            <a:normAutofit/>
+          </a:bodyPr>
           <a:lstStyle/>
           <a:p>
             <a:pPr marL="342900" indent="-342900" algn="l">
@@ -5246,15 +5483,7 @@
             </a:pPr>
             <a:r>
               <a:rPr lang="it-IT" dirty="0"/>
-              <a:t>Possibile utilizzo su sistemi semi-mobili non in </a:t>
-            </a:r>
-            <a:r>
-              <a:rPr lang="it-IT" dirty="0" err="1"/>
-              <a:t>real</a:t>
-            </a:r>
-            <a:r>
-              <a:rPr lang="it-IT" dirty="0"/>
-              <a:t> time.</a:t>
+              <a:t>Possibile ampliamento dell’applicazione verso l’ambito medico (studio dei movimenti corporei dei pazienti per diagnosi e ricerca).</a:t>
             </a:r>
           </a:p>
           <a:p>
@@ -5264,7 +5493,7 @@
             </a:pPr>
             <a:r>
               <a:rPr lang="it-IT" dirty="0"/>
-              <a:t>Possibile utilizzo nel post processing dei video.</a:t>
+              <a:t>Possibili miglioramenti riguardanti le prestazioni aumentando la potenza di calcolo (sostituendo la GPU) o limitandosi alla rilevazione della posizione del volto, aprendo anche la possibilità di allenare una rete neurale apposita.</a:t>
             </a:r>
           </a:p>
           <a:p>
@@ -5274,23 +5503,16 @@
             </a:pPr>
             <a:r>
               <a:rPr lang="it-IT" dirty="0"/>
-              <a:t>Possibile ampliamento in ambito medico (studio dei movimenti corporei dei pazienti per diagnosi e ricerca).</a:t>
-            </a:r>
-          </a:p>
-          <a:p>
-            <a:pPr marL="342900" indent="-342900" algn="l">
-              <a:buFontTx/>
-              <a:buChar char="-"/>
-            </a:pPr>
+              <a:t>Aumentando la potenza computazionale, si può sostituire la rete neurale con conseguente maggior precisione ed un numero incrementato di </a:t>
+            </a:r>
+            <a:r>
+              <a:rPr lang="it-IT" dirty="0" err="1"/>
+              <a:t>keypoints</a:t>
+            </a:r>
             <a:r>
               <a:rPr lang="it-IT" dirty="0"/>
-              <a:t>Possibili possono migliorare le prestazioni o cambiando rete neurale o aumentando la potenza di calcolo (sostituendo la GPU) o limitandosi alla rilevazione della posizione del volto, aprendo la possibilità di allenare una rete </a:t>
-            </a:r>
-            <a:r>
-              <a:rPr lang="it-IT"/>
-              <a:t>neurale apposita.</a:t>
-            </a:r>
-            <a:endParaRPr lang="it-IT" dirty="0"/>
+              <a:t>.</a:t>
+            </a:r>
           </a:p>
         </p:txBody>
       </p:sp>
@@ -5364,7 +5586,7 @@
                 <a:tabLst/>
                 <a:defRPr/>
               </a:pPr>
-              <a:t>21/11/2021</a:t>
+              <a:t>25/11/2021</a:t>
             </a:fld>
             <a:endParaRPr kumimoji="0" lang="en-US" sz="900" b="0" i="0" u="none" strike="noStrike" kern="1200" cap="none" spc="0" normalizeH="0" baseline="0" noProof="0">
               <a:ln>
@@ -5729,7 +5951,7 @@
                 <a:tabLst/>
                 <a:defRPr/>
               </a:pPr>
-              <a:t>21/11/2021</a:t>
+              <a:t>25/11/2021</a:t>
             </a:fld>
             <a:endParaRPr kumimoji="0" lang="en-US" sz="900" b="0" i="0" u="none" strike="noStrike" kern="1200" cap="none" spc="0" normalizeH="0" baseline="0" noProof="0">
               <a:ln>
@@ -6020,7 +6242,7 @@
                   <a:srgbClr val="FFFFFF"/>
                 </a:solidFill>
               </a:rPr>
-              <a:t>OBBIETTIVO DELLA TESI</a:t>
+              <a:t>OBIETTIVO DELLA TESI</a:t>
             </a:r>
           </a:p>
         </p:txBody>
@@ -6056,14 +6278,22 @@
             <a:pPr algn="l"/>
             <a:r>
               <a:rPr lang="it-IT" dirty="0"/>
-              <a:t>Oggi giorno, navigatori e reti neurali studiate per la guida autonoma (es. Tesla o comma.ai) si avvalgono di grandi quantità di immagini stradali e luoghi pubblici.</a:t>
+              <a:t>Oggi giorno, navigatori (street </a:t>
+            </a:r>
+            <a:r>
+              <a:rPr lang="it-IT" dirty="0" err="1"/>
+              <a:t>view</a:t>
+            </a:r>
+            <a:r>
+              <a:rPr lang="it-IT" dirty="0"/>
+              <a:t>) e reti neurali per la guida autonoma (es. Tesla, comma.ai) hanno necessità di grandi quantità di immagini stradali e luoghi pubblici.</a:t>
             </a:r>
           </a:p>
           <a:p>
             <a:pPr algn="l"/>
             <a:r>
               <a:rPr lang="it-IT" dirty="0"/>
-              <a:t>La presenza di persone all’interno dei frame utilizzati da queste applicazioni può portare a sanzioni economiche e legali legate alla privacy dei soggetti.</a:t>
+              <a:t>La presenza di persone all’interno dei frame utilizzati da queste applicazioni, può portare a sanzioni economiche e legali legate alla privacy dei soggetti.</a:t>
             </a:r>
           </a:p>
           <a:p>
@@ -6074,7 +6304,7 @@
             <a:pPr algn="l"/>
             <a:r>
               <a:rPr lang="it-IT" dirty="0"/>
-              <a:t>Per questi motivi è stata creata questa applicazione, che, stimando la posa delle persone, senza identificarle, ne copre poi in volto.</a:t>
+              <a:t>Per i seguenti motivi è stata creata questa applicazione, che, stimando la posa delle persone, senza identificarle, ne copre in volto.</a:t>
             </a:r>
           </a:p>
         </p:txBody>
@@ -6102,7 +6332,7 @@
           <a:p>
             <a:fld id="{EACE4ECE-4589-4666-B199-0F3643ABD5A2}" type="datetime1">
               <a:rPr lang="it-IT" smtClean="0"/>
-              <a:t>21/11/2021</a:t>
+              <a:t>25/11/2021</a:t>
             </a:fld>
             <a:endParaRPr lang="en-US"/>
           </a:p>
@@ -6308,31 +6538,31 @@
           <a:p>
             <a:r>
               <a:rPr lang="it-IT" sz="2400" dirty="0"/>
-              <a:t>Cattura di un frame</a:t>
+              <a:t>Cattura di un frame;</a:t>
             </a:r>
           </a:p>
           <a:p>
             <a:r>
               <a:rPr lang="it-IT" sz="2400" dirty="0"/>
-              <a:t>Creazione di un blob, formato di input per la rete neurale, dal frame</a:t>
+              <a:t>Creazione di un blob, formato di input per la rete neurale, dal frame;</a:t>
             </a:r>
           </a:p>
           <a:p>
             <a:r>
               <a:rPr lang="it-IT" sz="2400" dirty="0"/>
-              <a:t>Analisi del blob dalla rete neurale</a:t>
+              <a:t>Analisi del blob dalla rete neurale;</a:t>
             </a:r>
           </a:p>
           <a:p>
             <a:r>
               <a:rPr lang="it-IT" sz="2400" dirty="0"/>
-              <a:t>Elaborazione dell’output ricevuto dalla rete neurale</a:t>
+              <a:t>Elaborazione dell’output ricevuto dalla rete neurale;</a:t>
             </a:r>
           </a:p>
           <a:p>
             <a:r>
               <a:rPr lang="it-IT" sz="2400" dirty="0"/>
-              <a:t>Processing dell’immagine</a:t>
+              <a:t>Processing dell’immagine.</a:t>
             </a:r>
           </a:p>
         </p:txBody>
@@ -6360,7 +6590,7 @@
           <a:p>
             <a:fld id="{5997E0D3-1F6C-4EF7-9F59-B91FC5FC725C}" type="datetime1">
               <a:rPr lang="it-IT" smtClean="0"/>
-              <a:t>21/11/2021</a:t>
+              <a:t>25/11/2021</a:t>
             </a:fld>
             <a:endParaRPr lang="en-US"/>
           </a:p>
@@ -6545,7 +6775,7 @@
         </p:nvSpPr>
         <p:spPr>
           <a:xfrm>
-            <a:off x="762000" y="2548129"/>
+            <a:off x="1326080" y="2399684"/>
             <a:ext cx="4663440" cy="2487167"/>
           </a:xfrm>
         </p:spPr>
@@ -6585,7 +6815,7 @@
         </p:nvSpPr>
         <p:spPr>
           <a:xfrm>
-            <a:off x="8022336" y="2548129"/>
+            <a:off x="8022336" y="2429374"/>
             <a:ext cx="3407664" cy="2316479"/>
           </a:xfrm>
           <a:prstGeom prst="rect">
@@ -6802,8 +7032,8 @@
         </p:blipFill>
         <p:spPr bwMode="auto">
           <a:xfrm>
-            <a:off x="7266432" y="3138902"/>
-            <a:ext cx="3185160" cy="3185160"/>
+            <a:off x="7248619" y="2982957"/>
+            <a:ext cx="3407664" cy="3407664"/>
           </a:xfrm>
           <a:prstGeom prst="rect">
             <a:avLst/>
@@ -6849,7 +7079,7 @@
         </p:blipFill>
         <p:spPr bwMode="auto">
           <a:xfrm>
-            <a:off x="1740408" y="3138902"/>
+            <a:off x="2304488" y="2990457"/>
             <a:ext cx="2432304" cy="3219226"/>
           </a:xfrm>
           <a:prstGeom prst="rect">
@@ -6890,7 +7120,7 @@
           <a:p>
             <a:fld id="{2A5B21BD-8DF6-414C-96B9-8D34CEEC0A3D}" type="datetime1">
               <a:rPr lang="it-IT" smtClean="0"/>
-              <a:t>21/11/2021</a:t>
+              <a:t>25/11/2021</a:t>
             </a:fld>
             <a:endParaRPr lang="en-US"/>
           </a:p>
@@ -7120,7 +7350,7 @@
           <a:p>
             <a:fld id="{E2B9554C-F726-43B4-AA11-83BC98311E77}" type="datetime1">
               <a:rPr lang="it-IT" smtClean="0"/>
-              <a:t>21/11/2021</a:t>
+              <a:t>25/11/2021</a:t>
             </a:fld>
             <a:endParaRPr lang="en-US"/>
           </a:p>
@@ -7689,7 +7919,7 @@
                 <a:tabLst/>
                 <a:defRPr/>
               </a:pPr>
-              <a:t>21/11/2021</a:t>
+              <a:t>25/11/2021</a:t>
             </a:fld>
             <a:endParaRPr kumimoji="0" lang="en-US" sz="900" b="0" i="0" u="none" strike="noStrike" kern="1200" cap="none" spc="0" normalizeH="0" baseline="0" noProof="0">
               <a:ln>
@@ -8130,7 +8360,7 @@
             </a:r>
             <a:r>
               <a:rPr lang="it-IT" dirty="0"/>
-              <a:t> sono diversi punti del copro identificati dalla rete neurale, come mostrato in precedenza, la cui localizzazione è resa possibile grazie diverse mappe di probabilità restituite in output dalla rete neurale.</a:t>
+              <a:t> sono diversi punti del copro identificati dalla rete neurale la cui localizzazione è resa possibile grazie diverse mappe di probabilità restituite in output dalla rete neurale.</a:t>
             </a:r>
           </a:p>
         </p:txBody>
@@ -8295,7 +8525,7 @@
                 <a:tabLst/>
                 <a:defRPr/>
               </a:pPr>
-              <a:t>21/11/2021</a:t>
+              <a:t>25/11/2021</a:t>
             </a:fld>
             <a:endParaRPr kumimoji="0" lang="en-US" sz="900" b="0" i="0" u="none" strike="noStrike" kern="1200" cap="none" spc="0" normalizeH="0" baseline="0" noProof="0" dirty="0">
               <a:ln>
@@ -8715,7 +8945,7 @@
             <a:pPr algn="l"/>
             <a:r>
               <a:rPr lang="it-IT" dirty="0"/>
-              <a:t>Viene utilizzato per collegare correttamente tutti i </a:t>
+              <a:t>Viene utilizzato per collegare correttamente i </a:t>
             </a:r>
             <a:r>
               <a:rPr lang="it-IT" dirty="0" err="1"/>
@@ -8944,7 +9174,7 @@
                 <a:tabLst/>
                 <a:defRPr/>
               </a:pPr>
-              <a:t>21/11/2021</a:t>
+              <a:t>25/11/2021</a:t>
             </a:fld>
             <a:endParaRPr kumimoji="0" lang="en-US" sz="900" b="0" i="0" u="none" strike="noStrike" kern="1200" cap="none" spc="0" normalizeH="0" baseline="0" noProof="0">
               <a:ln>
@@ -9401,7 +9631,7 @@
                 <a:tabLst/>
                 <a:defRPr/>
               </a:pPr>
-              <a:t>21/11/2021</a:t>
+              <a:t>25/11/2021</a:t>
             </a:fld>
             <a:endParaRPr kumimoji="0" lang="en-US" sz="900" b="0" i="0" u="none" strike="noStrike" kern="1200" cap="none" spc="0" normalizeH="0" baseline="0" noProof="0">
               <a:ln>
@@ -9711,6 +9941,124 @@
           </a:prstGeom>
         </p:spPr>
       </p:pic>
+      <p:sp>
+        <p:nvSpPr>
+          <p:cNvPr id="21" name="Ovale 20">
+            <a:extLst>
+              <a:ext uri="{FF2B5EF4-FFF2-40B4-BE49-F238E27FC236}">
+                <a16:creationId xmlns:a16="http://schemas.microsoft.com/office/drawing/2014/main" id="{EB5100B4-6451-4D68-8D2C-AE3476B51FCE}"/>
+              </a:ext>
+            </a:extLst>
+          </p:cNvPr>
+          <p:cNvSpPr/>
+          <p:nvPr/>
+        </p:nvSpPr>
+        <p:spPr>
+          <a:xfrm>
+            <a:off x="10797844" y="4020138"/>
+            <a:ext cx="365760" cy="365760"/>
+          </a:xfrm>
+          <a:prstGeom prst="ellipse">
+            <a:avLst/>
+          </a:prstGeom>
+          <a:solidFill>
+            <a:srgbClr val="E71224">
+              <a:alpha val="5000"/>
+            </a:srgbClr>
+          </a:solidFill>
+          <a:ln w="18000">
+            <a:solidFill>
+              <a:srgbClr val="E71224"/>
+            </a:solidFill>
+          </a:ln>
+        </p:spPr>
+        <p:style>
+          <a:lnRef idx="2">
+            <a:schemeClr val="accent1">
+              <a:shade val="50000"/>
+            </a:schemeClr>
+          </a:lnRef>
+          <a:fillRef idx="1">
+            <a:schemeClr val="accent1"/>
+          </a:fillRef>
+          <a:effectRef idx="0">
+            <a:schemeClr val="accent1"/>
+          </a:effectRef>
+          <a:fontRef idx="minor">
+            <a:schemeClr val="lt1"/>
+          </a:fontRef>
+        </p:style>
+        <p:txBody>
+          <a:bodyPr wrap="none" rtlCol="0" anchor="ctr" anchorCtr="1"/>
+          <a:lstStyle/>
+          <a:p>
+            <a:endParaRPr lang="de-DE">
+              <a:solidFill>
+                <a:srgbClr val="E71224"/>
+              </a:solidFill>
+            </a:endParaRPr>
+          </a:p>
+        </p:txBody>
+      </p:sp>
+      <p:sp>
+        <p:nvSpPr>
+          <p:cNvPr id="13" name="Ovale 12">
+            <a:extLst>
+              <a:ext uri="{FF2B5EF4-FFF2-40B4-BE49-F238E27FC236}">
+                <a16:creationId xmlns:a16="http://schemas.microsoft.com/office/drawing/2014/main" id="{0EE5DB11-FF04-475E-A754-3FECD46EBBCB}"/>
+              </a:ext>
+            </a:extLst>
+          </p:cNvPr>
+          <p:cNvSpPr/>
+          <p:nvPr/>
+        </p:nvSpPr>
+        <p:spPr>
+          <a:xfrm>
+            <a:off x="2500950" y="2480304"/>
+            <a:ext cx="365760" cy="365760"/>
+          </a:xfrm>
+          <a:prstGeom prst="ellipse">
+            <a:avLst/>
+          </a:prstGeom>
+          <a:solidFill>
+            <a:srgbClr val="E71224">
+              <a:alpha val="5000"/>
+            </a:srgbClr>
+          </a:solidFill>
+          <a:ln w="18000">
+            <a:solidFill>
+              <a:srgbClr val="E71224"/>
+            </a:solidFill>
+          </a:ln>
+        </p:spPr>
+        <p:style>
+          <a:lnRef idx="2">
+            <a:schemeClr val="accent1">
+              <a:shade val="50000"/>
+            </a:schemeClr>
+          </a:lnRef>
+          <a:fillRef idx="1">
+            <a:schemeClr val="accent1"/>
+          </a:fillRef>
+          <a:effectRef idx="0">
+            <a:schemeClr val="accent1"/>
+          </a:effectRef>
+          <a:fontRef idx="minor">
+            <a:schemeClr val="lt1"/>
+          </a:fontRef>
+        </p:style>
+        <p:txBody>
+          <a:bodyPr wrap="none" rtlCol="0" anchor="ctr" anchorCtr="1"/>
+          <a:lstStyle/>
+          <a:p>
+            <a:endParaRPr lang="de-DE">
+              <a:solidFill>
+                <a:srgbClr val="E71224"/>
+              </a:solidFill>
+            </a:endParaRPr>
+          </a:p>
+        </p:txBody>
+      </p:sp>
     </p:spTree>
     <p:extLst>
       <p:ext uri="{BB962C8B-B14F-4D97-AF65-F5344CB8AC3E}">
@@ -9721,6 +10069,128 @@
   <p:clrMapOvr>
     <a:masterClrMapping/>
   </p:clrMapOvr>
+  <p:timing>
+    <p:tnLst>
+      <p:par>
+        <p:cTn id="1" dur="indefinite" restart="never" nodeType="tmRoot">
+          <p:childTnLst>
+            <p:seq concurrent="1" nextAc="seek">
+              <p:cTn id="2" dur="indefinite" nodeType="mainSeq">
+                <p:childTnLst>
+                  <p:par>
+                    <p:cTn id="3" fill="hold">
+                      <p:stCondLst>
+                        <p:cond delay="indefinite"/>
+                      </p:stCondLst>
+                      <p:childTnLst>
+                        <p:par>
+                          <p:cTn id="4" fill="hold">
+                            <p:stCondLst>
+                              <p:cond delay="0"/>
+                            </p:stCondLst>
+                            <p:childTnLst>
+                              <p:par>
+                                <p:cTn id="5" presetID="16" presetClass="entr" presetSubtype="21" fill="hold" grpId="0" nodeType="clickEffect">
+                                  <p:stCondLst>
+                                    <p:cond delay="0"/>
+                                  </p:stCondLst>
+                                  <p:childTnLst>
+                                    <p:set>
+                                      <p:cBhvr>
+                                        <p:cTn id="6" dur="1" fill="hold">
+                                          <p:stCondLst>
+                                            <p:cond delay="0"/>
+                                          </p:stCondLst>
+                                        </p:cTn>
+                                        <p:tgtEl>
+                                          <p:spTgt spid="21"/>
+                                        </p:tgtEl>
+                                        <p:attrNameLst>
+                                          <p:attrName>style.visibility</p:attrName>
+                                        </p:attrNameLst>
+                                      </p:cBhvr>
+                                      <p:to>
+                                        <p:strVal val="visible"/>
+                                      </p:to>
+                                    </p:set>
+                                    <p:animEffect transition="in" filter="barn(inVertical)">
+                                      <p:cBhvr>
+                                        <p:cTn id="7" dur="500"/>
+                                        <p:tgtEl>
+                                          <p:spTgt spid="21"/>
+                                        </p:tgtEl>
+                                      </p:cBhvr>
+                                    </p:animEffect>
+                                  </p:childTnLst>
+                                </p:cTn>
+                              </p:par>
+                              <p:par>
+                                <p:cTn id="8" presetID="16" presetClass="entr" presetSubtype="21" fill="hold" grpId="0" nodeType="withEffect">
+                                  <p:stCondLst>
+                                    <p:cond delay="0"/>
+                                  </p:stCondLst>
+                                  <p:childTnLst>
+                                    <p:set>
+                                      <p:cBhvr>
+                                        <p:cTn id="9" dur="1" fill="hold">
+                                          <p:stCondLst>
+                                            <p:cond delay="0"/>
+                                          </p:stCondLst>
+                                        </p:cTn>
+                                        <p:tgtEl>
+                                          <p:spTgt spid="13"/>
+                                        </p:tgtEl>
+                                        <p:attrNameLst>
+                                          <p:attrName>style.visibility</p:attrName>
+                                        </p:attrNameLst>
+                                      </p:cBhvr>
+                                      <p:to>
+                                        <p:strVal val="visible"/>
+                                      </p:to>
+                                    </p:set>
+                                    <p:animEffect transition="in" filter="barn(inVertical)">
+                                      <p:cBhvr>
+                                        <p:cTn id="10" dur="500"/>
+                                        <p:tgtEl>
+                                          <p:spTgt spid="13"/>
+                                        </p:tgtEl>
+                                      </p:cBhvr>
+                                    </p:animEffect>
+                                  </p:childTnLst>
+                                </p:cTn>
+                              </p:par>
+                            </p:childTnLst>
+                          </p:cTn>
+                        </p:par>
+                      </p:childTnLst>
+                    </p:cTn>
+                  </p:par>
+                </p:childTnLst>
+              </p:cTn>
+              <p:prevCondLst>
+                <p:cond evt="onPrev" delay="0">
+                  <p:tgtEl>
+                    <p:sldTgt/>
+                  </p:tgtEl>
+                </p:cond>
+              </p:prevCondLst>
+              <p:nextCondLst>
+                <p:cond evt="onNext" delay="0">
+                  <p:tgtEl>
+                    <p:sldTgt/>
+                  </p:tgtEl>
+                </p:cond>
+              </p:nextCondLst>
+            </p:seq>
+          </p:childTnLst>
+        </p:cTn>
+      </p:par>
+    </p:tnLst>
+    <p:bldLst>
+      <p:bldP spid="21" grpId="0" animBg="1"/>
+      <p:bldP spid="13" grpId="0" animBg="1"/>
+    </p:bldLst>
+  </p:timing>
 </p:sld>
 </file>
 

</xml_diff>